<commit_message>
Figures formatting for submission
</commit_message>
<xml_diff>
--- a/results/figures/figure 1.pptx
+++ b/results/figures/figure 1.pptx
@@ -126,13 +126,109 @@
 <file path=ppt/revisionInfo.xml><?xml version="1.0" encoding="utf-8"?>
 <p1510:revInfo xmlns:a="http://schemas.openxmlformats.org/drawingml/2006/main" xmlns:r="http://schemas.openxmlformats.org/officeDocument/2006/relationships" xmlns:p1510="http://schemas.microsoft.com/office/powerpoint/2015/10/main">
   <p1510:revLst>
-    <p1510:client id="{A9A07304-9510-4CE8-8BD2-0278185D4D07}" v="109" dt="2025-02-05T16:06:48.083"/>
+    <p1510:client id="{FCE93AB5-8872-4E7C-B0FB-FAF025DE33CB}" v="1" dt="2025-03-07T14:30:12.671"/>
   </p1510:revLst>
 </p1510:revInfo>
 </file>
 
 <file path=ppt/changesInfos/changesInfo1.xml><?xml version="1.0" encoding="utf-8"?>
 <pc:chgInfo xmlns:a="http://schemas.openxmlformats.org/drawingml/2006/main" xmlns:r="http://schemas.openxmlformats.org/officeDocument/2006/relationships" xmlns:ac="http://schemas.microsoft.com/office/drawing/2013/main/command" xmlns:pc="http://schemas.microsoft.com/office/powerpoint/2013/main/command">
+  <pc:docChgLst>
+    <pc:chgData name="CLARA ESPINOSA DEL ALBA" userId="56b0cbcd-66e9-4a2a-97b1-2aadcbcf6318" providerId="ADAL" clId="{FCE93AB5-8872-4E7C-B0FB-FAF025DE33CB}"/>
+    <pc:docChg chg="modSld">
+      <pc:chgData name="CLARA ESPINOSA DEL ALBA" userId="56b0cbcd-66e9-4a2a-97b1-2aadcbcf6318" providerId="ADAL" clId="{FCE93AB5-8872-4E7C-B0FB-FAF025DE33CB}" dt="2025-03-07T14:30:12.670" v="8" actId="5736"/>
+      <pc:docMkLst>
+        <pc:docMk/>
+      </pc:docMkLst>
+      <pc:sldChg chg="modSp mod">
+        <pc:chgData name="CLARA ESPINOSA DEL ALBA" userId="56b0cbcd-66e9-4a2a-97b1-2aadcbcf6318" providerId="ADAL" clId="{FCE93AB5-8872-4E7C-B0FB-FAF025DE33CB}" dt="2025-03-07T14:30:12.670" v="8" actId="5736"/>
+        <pc:sldMkLst>
+          <pc:docMk/>
+          <pc:sldMk cId="3720607955" sldId="256"/>
+        </pc:sldMkLst>
+        <pc:spChg chg="mod">
+          <ac:chgData name="CLARA ESPINOSA DEL ALBA" userId="56b0cbcd-66e9-4a2a-97b1-2aadcbcf6318" providerId="ADAL" clId="{FCE93AB5-8872-4E7C-B0FB-FAF025DE33CB}" dt="2025-03-07T14:30:12.670" v="8" actId="5736"/>
+          <ac:spMkLst>
+            <pc:docMk/>
+            <pc:sldMk cId="3720607955" sldId="256"/>
+            <ac:spMk id="11" creationId="{997598B1-4FB3-2813-1F63-E72AE36BC046}"/>
+          </ac:spMkLst>
+        </pc:spChg>
+        <pc:spChg chg="mod">
+          <ac:chgData name="CLARA ESPINOSA DEL ALBA" userId="56b0cbcd-66e9-4a2a-97b1-2aadcbcf6318" providerId="ADAL" clId="{FCE93AB5-8872-4E7C-B0FB-FAF025DE33CB}" dt="2025-03-07T14:30:12.670" v="8" actId="5736"/>
+          <ac:spMkLst>
+            <pc:docMk/>
+            <pc:sldMk cId="3720607955" sldId="256"/>
+            <ac:spMk id="15" creationId="{26FCF520-106F-449F-7499-8F70D2BE114D}"/>
+          </ac:spMkLst>
+        </pc:spChg>
+        <pc:spChg chg="mod">
+          <ac:chgData name="CLARA ESPINOSA DEL ALBA" userId="56b0cbcd-66e9-4a2a-97b1-2aadcbcf6318" providerId="ADAL" clId="{FCE93AB5-8872-4E7C-B0FB-FAF025DE33CB}" dt="2025-03-07T14:30:12.670" v="8" actId="5736"/>
+          <ac:spMkLst>
+            <pc:docMk/>
+            <pc:sldMk cId="3720607955" sldId="256"/>
+            <ac:spMk id="18" creationId="{004E609E-A8CB-FDD5-9760-5148E90E1FE1}"/>
+          </ac:spMkLst>
+        </pc:spChg>
+        <pc:spChg chg="mod">
+          <ac:chgData name="CLARA ESPINOSA DEL ALBA" userId="56b0cbcd-66e9-4a2a-97b1-2aadcbcf6318" providerId="ADAL" clId="{FCE93AB5-8872-4E7C-B0FB-FAF025DE33CB}" dt="2025-03-07T14:30:12.670" v="8" actId="5736"/>
+          <ac:spMkLst>
+            <pc:docMk/>
+            <pc:sldMk cId="3720607955" sldId="256"/>
+            <ac:spMk id="19" creationId="{7243137F-48A8-A841-02EF-B7103BE245D1}"/>
+          </ac:spMkLst>
+        </pc:spChg>
+        <pc:spChg chg="mod">
+          <ac:chgData name="CLARA ESPINOSA DEL ALBA" userId="56b0cbcd-66e9-4a2a-97b1-2aadcbcf6318" providerId="ADAL" clId="{FCE93AB5-8872-4E7C-B0FB-FAF025DE33CB}" dt="2025-03-07T14:30:12.670" v="8" actId="5736"/>
+          <ac:spMkLst>
+            <pc:docMk/>
+            <pc:sldMk cId="3720607955" sldId="256"/>
+            <ac:spMk id="20" creationId="{94F70A10-DBCD-2E40-C60F-13208C793900}"/>
+          </ac:spMkLst>
+        </pc:spChg>
+        <pc:spChg chg="mod">
+          <ac:chgData name="CLARA ESPINOSA DEL ALBA" userId="56b0cbcd-66e9-4a2a-97b1-2aadcbcf6318" providerId="ADAL" clId="{FCE93AB5-8872-4E7C-B0FB-FAF025DE33CB}" dt="2025-03-07T14:30:12.670" v="8" actId="5736"/>
+          <ac:spMkLst>
+            <pc:docMk/>
+            <pc:sldMk cId="3720607955" sldId="256"/>
+            <ac:spMk id="25" creationId="{7831ABAF-044E-0809-F8D1-21F4EAA766B2}"/>
+          </ac:spMkLst>
+        </pc:spChg>
+        <pc:spChg chg="mod">
+          <ac:chgData name="CLARA ESPINOSA DEL ALBA" userId="56b0cbcd-66e9-4a2a-97b1-2aadcbcf6318" providerId="ADAL" clId="{FCE93AB5-8872-4E7C-B0FB-FAF025DE33CB}" dt="2025-03-07T14:30:12.670" v="8" actId="5736"/>
+          <ac:spMkLst>
+            <pc:docMk/>
+            <pc:sldMk cId="3720607955" sldId="256"/>
+            <ac:spMk id="116" creationId="{EAE8F02D-A808-854E-38AD-DADF7CB1A847}"/>
+          </ac:spMkLst>
+        </pc:spChg>
+        <pc:grpChg chg="mod">
+          <ac:chgData name="CLARA ESPINOSA DEL ALBA" userId="56b0cbcd-66e9-4a2a-97b1-2aadcbcf6318" providerId="ADAL" clId="{FCE93AB5-8872-4E7C-B0FB-FAF025DE33CB}" dt="2025-03-07T14:30:12.670" v="8" actId="5736"/>
+          <ac:grpSpMkLst>
+            <pc:docMk/>
+            <pc:sldMk cId="3720607955" sldId="256"/>
+            <ac:grpSpMk id="115" creationId="{E0D14C94-D541-1A1D-C5C8-FA06A9EDF4A9}"/>
+          </ac:grpSpMkLst>
+        </pc:grpChg>
+        <pc:graphicFrameChg chg="mod">
+          <ac:chgData name="CLARA ESPINOSA DEL ALBA" userId="56b0cbcd-66e9-4a2a-97b1-2aadcbcf6318" providerId="ADAL" clId="{FCE93AB5-8872-4E7C-B0FB-FAF025DE33CB}" dt="2025-03-07T14:30:12.670" v="8" actId="5736"/>
+          <ac:graphicFrameMkLst>
+            <pc:docMk/>
+            <pc:sldMk cId="3720607955" sldId="256"/>
+            <ac:graphicFrameMk id="33" creationId="{37DE1CFD-212B-3603-7BC9-13092CE90A5D}"/>
+          </ac:graphicFrameMkLst>
+        </pc:graphicFrameChg>
+        <pc:picChg chg="mod">
+          <ac:chgData name="CLARA ESPINOSA DEL ALBA" userId="56b0cbcd-66e9-4a2a-97b1-2aadcbcf6318" providerId="ADAL" clId="{FCE93AB5-8872-4E7C-B0FB-FAF025DE33CB}" dt="2025-03-07T14:30:12.670" v="8" actId="5736"/>
+          <ac:picMkLst>
+            <pc:docMk/>
+            <pc:sldMk cId="3720607955" sldId="256"/>
+            <ac:picMk id="8" creationId="{52D2240F-3622-BBF4-892C-653FF2674DF3}"/>
+          </ac:picMkLst>
+        </pc:picChg>
+      </pc:sldChg>
+    </pc:docChg>
+  </pc:docChgLst>
   <pc:docChgLst>
     <pc:chgData name="CLARA ESPINOSA DEL ALBA" userId="56b0cbcd-66e9-4a2a-97b1-2aadcbcf6318" providerId="ADAL" clId="{A9A07304-9510-4CE8-8BD2-0278185D4D07}"/>
     <pc:docChg chg="undo redo custSel modSld">
@@ -146,28 +242,12 @@
           <pc:docMk/>
           <pc:sldMk cId="3720607955" sldId="256"/>
         </pc:sldMkLst>
-        <pc:spChg chg="del mod">
-          <ac:chgData name="CLARA ESPINOSA DEL ALBA" userId="56b0cbcd-66e9-4a2a-97b1-2aadcbcf6318" providerId="ADAL" clId="{A9A07304-9510-4CE8-8BD2-0278185D4D07}" dt="2025-02-05T14:04:44.604" v="1653" actId="478"/>
-          <ac:spMkLst>
-            <pc:docMk/>
-            <pc:sldMk cId="3720607955" sldId="256"/>
-            <ac:spMk id="3" creationId="{2D389448-77EE-E291-1FF5-4B712DD348B9}"/>
-          </ac:spMkLst>
-        </pc:spChg>
         <pc:spChg chg="add mod">
           <ac:chgData name="CLARA ESPINOSA DEL ALBA" userId="56b0cbcd-66e9-4a2a-97b1-2aadcbcf6318" providerId="ADAL" clId="{A9A07304-9510-4CE8-8BD2-0278185D4D07}" dt="2025-02-05T14:04:44.604" v="1653" actId="478"/>
           <ac:spMkLst>
             <pc:docMk/>
             <pc:sldMk cId="3720607955" sldId="256"/>
             <ac:spMk id="4" creationId="{4F958F42-7F11-CD0D-9066-5E8E1F29977F}"/>
-          </ac:spMkLst>
-        </pc:spChg>
-        <pc:spChg chg="del mod">
-          <ac:chgData name="CLARA ESPINOSA DEL ALBA" userId="56b0cbcd-66e9-4a2a-97b1-2aadcbcf6318" providerId="ADAL" clId="{A9A07304-9510-4CE8-8BD2-0278185D4D07}" dt="2025-02-05T14:04:08.333" v="1645" actId="478"/>
-          <ac:spMkLst>
-            <pc:docMk/>
-            <pc:sldMk cId="3720607955" sldId="256"/>
-            <ac:spMk id="10" creationId="{8BCAD143-B3DF-21B3-55B2-B404C4BFB14B}"/>
           </ac:spMkLst>
         </pc:spChg>
         <pc:spChg chg="mod">
@@ -178,44 +258,12 @@
             <ac:spMk id="11" creationId="{997598B1-4FB3-2813-1F63-E72AE36BC046}"/>
           </ac:spMkLst>
         </pc:spChg>
-        <pc:spChg chg="del mod">
-          <ac:chgData name="CLARA ESPINOSA DEL ALBA" userId="56b0cbcd-66e9-4a2a-97b1-2aadcbcf6318" providerId="ADAL" clId="{A9A07304-9510-4CE8-8BD2-0278185D4D07}" dt="2025-02-05T14:04:10.974" v="1646" actId="478"/>
-          <ac:spMkLst>
-            <pc:docMk/>
-            <pc:sldMk cId="3720607955" sldId="256"/>
-            <ac:spMk id="12" creationId="{D1AF64B9-11AB-6E94-3F2C-875E43EA5E3E}"/>
-          </ac:spMkLst>
-        </pc:spChg>
-        <pc:spChg chg="del mod">
-          <ac:chgData name="CLARA ESPINOSA DEL ALBA" userId="56b0cbcd-66e9-4a2a-97b1-2aadcbcf6318" providerId="ADAL" clId="{A9A07304-9510-4CE8-8BD2-0278185D4D07}" dt="2025-02-05T14:04:11.639" v="1647" actId="478"/>
-          <ac:spMkLst>
-            <pc:docMk/>
-            <pc:sldMk cId="3720607955" sldId="256"/>
-            <ac:spMk id="14" creationId="{1CA093A2-1EA5-B119-4A56-7A4AFB2B134D}"/>
-          </ac:spMkLst>
-        </pc:spChg>
         <pc:spChg chg="mod">
           <ac:chgData name="CLARA ESPINOSA DEL ALBA" userId="56b0cbcd-66e9-4a2a-97b1-2aadcbcf6318" providerId="ADAL" clId="{A9A07304-9510-4CE8-8BD2-0278185D4D07}" dt="2025-02-05T16:07:05.008" v="1929" actId="1036"/>
           <ac:spMkLst>
             <pc:docMk/>
             <pc:sldMk cId="3720607955" sldId="256"/>
             <ac:spMk id="15" creationId="{26FCF520-106F-449F-7499-8F70D2BE114D}"/>
-          </ac:spMkLst>
-        </pc:spChg>
-        <pc:spChg chg="del mod">
-          <ac:chgData name="CLARA ESPINOSA DEL ALBA" userId="56b0cbcd-66e9-4a2a-97b1-2aadcbcf6318" providerId="ADAL" clId="{A9A07304-9510-4CE8-8BD2-0278185D4D07}" dt="2025-02-05T14:04:12.447" v="1648" actId="478"/>
-          <ac:spMkLst>
-            <pc:docMk/>
-            <pc:sldMk cId="3720607955" sldId="256"/>
-            <ac:spMk id="16" creationId="{B2162A06-D64A-81A8-FD9E-DC34150D5EFF}"/>
-          </ac:spMkLst>
-        </pc:spChg>
-        <pc:spChg chg="del mod">
-          <ac:chgData name="CLARA ESPINOSA DEL ALBA" userId="56b0cbcd-66e9-4a2a-97b1-2aadcbcf6318" providerId="ADAL" clId="{A9A07304-9510-4CE8-8BD2-0278185D4D07}" dt="2025-02-05T14:04:13.274" v="1649" actId="478"/>
-          <ac:spMkLst>
-            <pc:docMk/>
-            <pc:sldMk cId="3720607955" sldId="256"/>
-            <ac:spMk id="17" creationId="{36D83821-4DE2-F31F-DD0C-7A4F1882F74F}"/>
           </ac:spMkLst>
         </pc:spChg>
         <pc:spChg chg="mod">
@@ -322,22 +370,6 @@
             <ac:graphicFrameMk id="33" creationId="{37DE1CFD-212B-3603-7BC9-13092CE90A5D}"/>
           </ac:graphicFrameMkLst>
         </pc:graphicFrameChg>
-        <pc:picChg chg="del mod modCrop">
-          <ac:chgData name="CLARA ESPINOSA DEL ALBA" userId="56b0cbcd-66e9-4a2a-97b1-2aadcbcf6318" providerId="ADAL" clId="{A9A07304-9510-4CE8-8BD2-0278185D4D07}" dt="2025-02-05T14:04:04.678" v="1644" actId="478"/>
-          <ac:picMkLst>
-            <pc:docMk/>
-            <pc:sldMk cId="3720607955" sldId="256"/>
-            <ac:picMk id="5" creationId="{46CB3632-83A7-760B-4BB3-E28B62ABB883}"/>
-          </ac:picMkLst>
-        </pc:picChg>
-        <pc:picChg chg="del mod">
-          <ac:chgData name="CLARA ESPINOSA DEL ALBA" userId="56b0cbcd-66e9-4a2a-97b1-2aadcbcf6318" providerId="ADAL" clId="{A9A07304-9510-4CE8-8BD2-0278185D4D07}" dt="2025-02-05T14:17:25.491" v="1780" actId="478"/>
-          <ac:picMkLst>
-            <pc:docMk/>
-            <pc:sldMk cId="3720607955" sldId="256"/>
-            <ac:picMk id="7" creationId="{621CDCC2-E587-304D-4B8E-AE3C36CD3182}"/>
-          </ac:picMkLst>
-        </pc:picChg>
         <pc:picChg chg="add mod modCrop">
           <ac:chgData name="CLARA ESPINOSA DEL ALBA" userId="56b0cbcd-66e9-4a2a-97b1-2aadcbcf6318" providerId="ADAL" clId="{A9A07304-9510-4CE8-8BD2-0278185D4D07}" dt="2025-02-05T16:07:03.705" v="1924" actId="1035"/>
           <ac:picMkLst>
@@ -683,7 +715,7 @@
           <a:p>
             <a:fld id="{C59A789F-7494-43A5-B7F5-5B4607213234}" type="datetimeFigureOut">
               <a:rPr lang="es-ES" smtClean="0"/>
-              <a:t>05/02/2025</a:t>
+              <a:t>07/03/2025</a:t>
             </a:fld>
             <a:endParaRPr lang="es-ES"/>
           </a:p>
@@ -853,7 +885,7 @@
           <a:p>
             <a:fld id="{C59A789F-7494-43A5-B7F5-5B4607213234}" type="datetimeFigureOut">
               <a:rPr lang="es-ES" smtClean="0"/>
-              <a:t>05/02/2025</a:t>
+              <a:t>07/03/2025</a:t>
             </a:fld>
             <a:endParaRPr lang="es-ES"/>
           </a:p>
@@ -1033,7 +1065,7 @@
           <a:p>
             <a:fld id="{C59A789F-7494-43A5-B7F5-5B4607213234}" type="datetimeFigureOut">
               <a:rPr lang="es-ES" smtClean="0"/>
-              <a:t>05/02/2025</a:t>
+              <a:t>07/03/2025</a:t>
             </a:fld>
             <a:endParaRPr lang="es-ES"/>
           </a:p>
@@ -1203,7 +1235,7 @@
           <a:p>
             <a:fld id="{C59A789F-7494-43A5-B7F5-5B4607213234}" type="datetimeFigureOut">
               <a:rPr lang="es-ES" smtClean="0"/>
-              <a:t>05/02/2025</a:t>
+              <a:t>07/03/2025</a:t>
             </a:fld>
             <a:endParaRPr lang="es-ES"/>
           </a:p>
@@ -1449,7 +1481,7 @@
           <a:p>
             <a:fld id="{C59A789F-7494-43A5-B7F5-5B4607213234}" type="datetimeFigureOut">
               <a:rPr lang="es-ES" smtClean="0"/>
-              <a:t>05/02/2025</a:t>
+              <a:t>07/03/2025</a:t>
             </a:fld>
             <a:endParaRPr lang="es-ES"/>
           </a:p>
@@ -1681,7 +1713,7 @@
           <a:p>
             <a:fld id="{C59A789F-7494-43A5-B7F5-5B4607213234}" type="datetimeFigureOut">
               <a:rPr lang="es-ES" smtClean="0"/>
-              <a:t>05/02/2025</a:t>
+              <a:t>07/03/2025</a:t>
             </a:fld>
             <a:endParaRPr lang="es-ES"/>
           </a:p>
@@ -2048,7 +2080,7 @@
           <a:p>
             <a:fld id="{C59A789F-7494-43A5-B7F5-5B4607213234}" type="datetimeFigureOut">
               <a:rPr lang="es-ES" smtClean="0"/>
-              <a:t>05/02/2025</a:t>
+              <a:t>07/03/2025</a:t>
             </a:fld>
             <a:endParaRPr lang="es-ES"/>
           </a:p>
@@ -2166,7 +2198,7 @@
           <a:p>
             <a:fld id="{C59A789F-7494-43A5-B7F5-5B4607213234}" type="datetimeFigureOut">
               <a:rPr lang="es-ES" smtClean="0"/>
-              <a:t>05/02/2025</a:t>
+              <a:t>07/03/2025</a:t>
             </a:fld>
             <a:endParaRPr lang="es-ES"/>
           </a:p>
@@ -2261,7 +2293,7 @@
           <a:p>
             <a:fld id="{C59A789F-7494-43A5-B7F5-5B4607213234}" type="datetimeFigureOut">
               <a:rPr lang="es-ES" smtClean="0"/>
-              <a:t>05/02/2025</a:t>
+              <a:t>07/03/2025</a:t>
             </a:fld>
             <a:endParaRPr lang="es-ES"/>
           </a:p>
@@ -2538,7 +2570,7 @@
           <a:p>
             <a:fld id="{C59A789F-7494-43A5-B7F5-5B4607213234}" type="datetimeFigureOut">
               <a:rPr lang="es-ES" smtClean="0"/>
-              <a:t>05/02/2025</a:t>
+              <a:t>07/03/2025</a:t>
             </a:fld>
             <a:endParaRPr lang="es-ES"/>
           </a:p>
@@ -2795,7 +2827,7 @@
           <a:p>
             <a:fld id="{C59A789F-7494-43A5-B7F5-5B4607213234}" type="datetimeFigureOut">
               <a:rPr lang="es-ES" smtClean="0"/>
-              <a:t>05/02/2025</a:t>
+              <a:t>07/03/2025</a:t>
             </a:fld>
             <a:endParaRPr lang="es-ES"/>
           </a:p>
@@ -3008,7 +3040,7 @@
           <a:p>
             <a:fld id="{C59A789F-7494-43A5-B7F5-5B4607213234}" type="datetimeFigureOut">
               <a:rPr lang="es-ES" smtClean="0"/>
-              <a:t>05/02/2025</a:t>
+              <a:t>07/03/2025</a:t>
             </a:fld>
             <a:endParaRPr lang="es-ES"/>
           </a:p>
@@ -3477,7 +3509,15 @@
           <a:p>
             <a:r>
               <a:rPr lang="es-ES" sz="1200" dirty="0"/>
-              <a:t>B) Altitudinal expected gradient</a:t>
+              <a:t>(</a:t>
+            </a:r>
+            <a:r>
+              <a:rPr lang="es-ES" sz="1200" b="1" dirty="0"/>
+              <a:t>b</a:t>
+            </a:r>
+            <a:r>
+              <a:rPr lang="es-ES" sz="1200" dirty="0"/>
+              <a:t>) Altitudinal expected gradient</a:t>
             </a:r>
           </a:p>
         </p:txBody>
@@ -3748,7 +3788,15 @@
           <a:p>
             <a:r>
               <a:rPr lang="es-ES" sz="1200" dirty="0"/>
-              <a:t>A) Fatty acids biochemical properties</a:t>
+              <a:t>(</a:t>
+            </a:r>
+            <a:r>
+              <a:rPr lang="es-ES" sz="1200" b="1" dirty="0"/>
+              <a:t>a</a:t>
+            </a:r>
+            <a:r>
+              <a:rPr lang="es-ES" sz="1200" dirty="0"/>
+              <a:t>) Fatty acids biochemical properties</a:t>
             </a:r>
           </a:p>
         </p:txBody>
@@ -3768,7 +3816,7 @@
           <p:nvPr>
             <p:extLst>
               <p:ext uri="{D42A27DB-BD31-4B8C-83A1-F6EECF244321}">
-                <p14:modId xmlns:p14="http://schemas.microsoft.com/office/powerpoint/2010/main" val="1855187899"/>
+                <p14:modId xmlns:p14="http://schemas.microsoft.com/office/powerpoint/2010/main" val="3507612421"/>
               </p:ext>
             </p:extLst>
           </p:nvPr>

</xml_diff>